<commit_message>
webscraping additional functionalitya dded
</commit_message>
<xml_diff>
--- a/Python/python_presentation.pptx
+++ b/Python/python_presentation.pptx
@@ -5,15 +5,16 @@
     <p:sldMasterId id="2147483648" r:id="rId1"/>
   </p:sldMasterIdLst>
   <p:notesMasterIdLst>
-    <p:notesMasterId r:id="rId8"/>
+    <p:notesMasterId r:id="rId9"/>
   </p:notesMasterIdLst>
   <p:sldIdLst>
     <p:sldId id="256" r:id="rId2"/>
     <p:sldId id="257" r:id="rId3"/>
-    <p:sldId id="259" r:id="rId4"/>
-    <p:sldId id="263" r:id="rId5"/>
-    <p:sldId id="260" r:id="rId6"/>
-    <p:sldId id="261" r:id="rId7"/>
+    <p:sldId id="264" r:id="rId4"/>
+    <p:sldId id="259" r:id="rId5"/>
+    <p:sldId id="263" r:id="rId6"/>
+    <p:sldId id="260" r:id="rId7"/>
+    <p:sldId id="261" r:id="rId8"/>
   </p:sldIdLst>
   <p:sldSz cx="12192000" cy="6858000"/>
   <p:notesSz cx="6858000" cy="9144000"/>
@@ -3604,10 +3605,6 @@
           <a:bodyPr/>
           <a:lstStyle/>
           <a:p>
-            <a:r>
-              <a:rPr lang="en-US" dirty="0" smtClean="0"/>
-              <a:t>Basic Data Structures</a:t>
-            </a:r>
             <a:endParaRPr lang="en-US" dirty="0"/>
           </a:p>
         </p:txBody>
@@ -3627,44 +3624,14 @@
           <a:bodyPr/>
           <a:lstStyle/>
           <a:p>
-            <a:r>
-              <a:rPr lang="en-US" dirty="0" smtClean="0"/>
-              <a:t>Lists - mutable</a:t>
-            </a:r>
-          </a:p>
-          <a:p>
-            <a:endParaRPr lang="en-US" dirty="0"/>
-          </a:p>
-          <a:p>
-            <a:r>
-              <a:rPr lang="en-US" dirty="0" smtClean="0"/>
-              <a:t>Dictionaries - mutable</a:t>
-            </a:r>
-          </a:p>
-          <a:p>
-            <a:endParaRPr lang="en-US" dirty="0"/>
-          </a:p>
-          <a:p>
-            <a:r>
-              <a:rPr lang="en-US" dirty="0" smtClean="0"/>
-              <a:t>Tuples </a:t>
-            </a:r>
-            <a:r>
-              <a:rPr lang="mr-IN" dirty="0" smtClean="0"/>
-              <a:t>–</a:t>
-            </a:r>
-            <a:r>
-              <a:rPr lang="en-US" dirty="0" smtClean="0"/>
-              <a:t> immutable (does not support item assignment)</a:t>
-            </a:r>
-            <a:endParaRPr lang="en-US" dirty="0"/>
+            <a:endParaRPr lang="en-US"/>
           </a:p>
         </p:txBody>
       </p:sp>
     </p:spTree>
     <p:extLst>
       <p:ext uri="{BB962C8B-B14F-4D97-AF65-F5344CB8AC3E}">
-        <p14:creationId xmlns:p14="http://schemas.microsoft.com/office/powerpoint/2010/main" val="230451898"/>
+        <p14:creationId xmlns:p14="http://schemas.microsoft.com/office/powerpoint/2010/main" val="2122723809"/>
       </p:ext>
     </p:extLst>
   </p:cSld>
@@ -3708,7 +3675,45 @@
           <a:p>
             <a:r>
               <a:rPr lang="en-US" dirty="0" smtClean="0"/>
-              <a:t>Pandas </a:t>
+              <a:t>Basic Data Structures</a:t>
+            </a:r>
+            <a:endParaRPr lang="en-US" dirty="0"/>
+          </a:p>
+        </p:txBody>
+      </p:sp>
+      <p:sp>
+        <p:nvSpPr>
+          <p:cNvPr id="3" name="Content Placeholder 2"/>
+          <p:cNvSpPr>
+            <a:spLocks noGrp="1"/>
+          </p:cNvSpPr>
+          <p:nvPr>
+            <p:ph idx="1"/>
+          </p:nvPr>
+        </p:nvSpPr>
+        <p:spPr/>
+        <p:txBody>
+          <a:bodyPr/>
+          <a:lstStyle/>
+          <a:p>
+            <a:r>
+              <a:rPr lang="en-US" dirty="0" smtClean="0"/>
+              <a:t>Lists - mutable</a:t>
+            </a:r>
+          </a:p>
+          <a:p>
+            <a:r>
+              <a:rPr lang="en-US" dirty="0" smtClean="0"/>
+              <a:t>[elements, in, list]</a:t>
+            </a:r>
+          </a:p>
+          <a:p>
+            <a:endParaRPr lang="en-US" dirty="0"/>
+          </a:p>
+          <a:p>
+            <a:r>
+              <a:rPr lang="en-US" dirty="0" smtClean="0"/>
+              <a:t>Dictionaries </a:t>
             </a:r>
             <a:r>
               <a:rPr lang="mr-IN" dirty="0" smtClean="0"/>
@@ -3716,77 +3721,37 @@
             </a:r>
             <a:r>
               <a:rPr lang="en-US" dirty="0" smtClean="0"/>
-              <a:t> a </a:t>
-            </a:r>
-            <a:r>
-              <a:rPr lang="en-US" dirty="0" err="1" smtClean="0"/>
-              <a:t>dataframe</a:t>
-            </a:r>
-            <a:r>
-              <a:rPr lang="en-US" smtClean="0"/>
-              <a:t> object</a:t>
-            </a:r>
+              <a:t> mutable</a:t>
+            </a:r>
+          </a:p>
+          <a:p>
+            <a:r>
+              <a:rPr lang="en-US" dirty="0" smtClean="0"/>
+              <a:t>{key: value}</a:t>
+            </a:r>
+          </a:p>
+          <a:p>
             <a:endParaRPr lang="en-US" dirty="0"/>
           </a:p>
-        </p:txBody>
-      </p:sp>
-      <p:sp>
-        <p:nvSpPr>
-          <p:cNvPr id="3" name="Content Placeholder 2"/>
-          <p:cNvSpPr>
-            <a:spLocks noGrp="1"/>
-          </p:cNvSpPr>
-          <p:nvPr>
-            <p:ph idx="1"/>
-          </p:nvPr>
-        </p:nvSpPr>
-        <p:spPr/>
-        <p:txBody>
-          <a:bodyPr/>
-          <a:lstStyle/>
           <a:p>
             <a:r>
               <a:rPr lang="en-US" dirty="0" smtClean="0"/>
-              <a:t>List of dictionaries</a:t>
-            </a:r>
-          </a:p>
-          <a:p>
-            <a:endParaRPr lang="en-US" dirty="0"/>
-          </a:p>
-          <a:p>
+              <a:t>Tuples </a:t>
+            </a:r>
+            <a:r>
+              <a:rPr lang="mr-IN" dirty="0" smtClean="0"/>
+              <a:t>–</a:t>
+            </a:r>
             <a:r>
               <a:rPr lang="en-US" dirty="0" smtClean="0"/>
-              <a:t>Specifically an </a:t>
-            </a:r>
-            <a:r>
-              <a:rPr lang="en-US" dirty="0" err="1" smtClean="0"/>
-              <a:t>ndarray</a:t>
-            </a:r>
+              <a:t> immutable (does not support item assignment)</a:t>
+            </a:r>
+          </a:p>
+          <a:p>
             <a:r>
               <a:rPr lang="en-US" dirty="0" smtClean="0"/>
-              <a:t> of dictionaries (</a:t>
-            </a:r>
-            <a:r>
-              <a:rPr lang="en-US" dirty="0" err="1" smtClean="0"/>
-              <a:t>ndarray</a:t>
-            </a:r>
-            <a:r>
-              <a:rPr lang="en-US" dirty="0" smtClean="0"/>
-              <a:t> is a </a:t>
-            </a:r>
-            <a:r>
-              <a:rPr lang="en-US" dirty="0" err="1" smtClean="0"/>
-              <a:t>numpy</a:t>
-            </a:r>
-            <a:r>
-              <a:rPr lang="en-US" dirty="0" smtClean="0"/>
-              <a:t> object)</a:t>
-            </a:r>
-          </a:p>
-          <a:p>
-            <a:endParaRPr lang="en-US" dirty="0"/>
-          </a:p>
-          <a:p>
+              <a:t>(items, in, tuple)</a:t>
+            </a:r>
             <a:endParaRPr lang="en-US" dirty="0"/>
           </a:p>
         </p:txBody>
@@ -3794,7 +3759,7 @@
     </p:spTree>
     <p:extLst>
       <p:ext uri="{BB962C8B-B14F-4D97-AF65-F5344CB8AC3E}">
-        <p14:creationId xmlns:p14="http://schemas.microsoft.com/office/powerpoint/2010/main" val="721878205"/>
+        <p14:creationId xmlns:p14="http://schemas.microsoft.com/office/powerpoint/2010/main" val="230451898"/>
       </p:ext>
     </p:extLst>
   </p:cSld>
@@ -3838,6 +3803,136 @@
           <a:p>
             <a:r>
               <a:rPr lang="en-US" dirty="0" smtClean="0"/>
+              <a:t>Pandas </a:t>
+            </a:r>
+            <a:r>
+              <a:rPr lang="mr-IN" dirty="0" smtClean="0"/>
+              <a:t>–</a:t>
+            </a:r>
+            <a:r>
+              <a:rPr lang="en-US" dirty="0" smtClean="0"/>
+              <a:t> a </a:t>
+            </a:r>
+            <a:r>
+              <a:rPr lang="en-US" dirty="0" err="1" smtClean="0"/>
+              <a:t>dataframe</a:t>
+            </a:r>
+            <a:r>
+              <a:rPr lang="en-US" dirty="0" smtClean="0"/>
+              <a:t> object</a:t>
+            </a:r>
+            <a:endParaRPr lang="en-US" dirty="0"/>
+          </a:p>
+        </p:txBody>
+      </p:sp>
+      <p:sp>
+        <p:nvSpPr>
+          <p:cNvPr id="3" name="Content Placeholder 2"/>
+          <p:cNvSpPr>
+            <a:spLocks noGrp="1"/>
+          </p:cNvSpPr>
+          <p:nvPr>
+            <p:ph idx="1"/>
+          </p:nvPr>
+        </p:nvSpPr>
+        <p:spPr/>
+        <p:txBody>
+          <a:bodyPr/>
+          <a:lstStyle/>
+          <a:p>
+            <a:r>
+              <a:rPr lang="en-US" dirty="0" smtClean="0"/>
+              <a:t>List of dictionaries</a:t>
+            </a:r>
+          </a:p>
+          <a:p>
+            <a:endParaRPr lang="en-US" dirty="0"/>
+          </a:p>
+          <a:p>
+            <a:r>
+              <a:rPr lang="en-US" dirty="0" smtClean="0"/>
+              <a:t>Specifically an </a:t>
+            </a:r>
+            <a:r>
+              <a:rPr lang="en-US" dirty="0" err="1" smtClean="0"/>
+              <a:t>ndarray</a:t>
+            </a:r>
+            <a:r>
+              <a:rPr lang="en-US" dirty="0" smtClean="0"/>
+              <a:t> of dictionaries (</a:t>
+            </a:r>
+            <a:r>
+              <a:rPr lang="en-US" dirty="0" err="1" smtClean="0"/>
+              <a:t>ndarray</a:t>
+            </a:r>
+            <a:r>
+              <a:rPr lang="en-US" dirty="0" smtClean="0"/>
+              <a:t> is a </a:t>
+            </a:r>
+            <a:r>
+              <a:rPr lang="en-US" dirty="0" err="1" smtClean="0"/>
+              <a:t>numpy</a:t>
+            </a:r>
+            <a:r>
+              <a:rPr lang="en-US" dirty="0" smtClean="0"/>
+              <a:t> object)</a:t>
+            </a:r>
+          </a:p>
+          <a:p>
+            <a:endParaRPr lang="en-US" dirty="0"/>
+          </a:p>
+          <a:p>
+            <a:endParaRPr lang="en-US" dirty="0"/>
+          </a:p>
+        </p:txBody>
+      </p:sp>
+    </p:spTree>
+    <p:extLst>
+      <p:ext uri="{BB962C8B-B14F-4D97-AF65-F5344CB8AC3E}">
+        <p14:creationId xmlns:p14="http://schemas.microsoft.com/office/powerpoint/2010/main" val="721878205"/>
+      </p:ext>
+    </p:extLst>
+  </p:cSld>
+  <p:clrMapOvr>
+    <a:masterClrMapping/>
+  </p:clrMapOvr>
+</p:sld>
+</file>
+
+<file path=ppt/slides/slide6.xml><?xml version="1.0" encoding="utf-8"?>
+<p:sld xmlns:a="http://schemas.openxmlformats.org/drawingml/2006/main" xmlns:r="http://schemas.openxmlformats.org/officeDocument/2006/relationships" xmlns:p="http://schemas.openxmlformats.org/presentationml/2006/main">
+  <p:cSld>
+    <p:spTree>
+      <p:nvGrpSpPr>
+        <p:cNvPr id="1" name=""/>
+        <p:cNvGrpSpPr/>
+        <p:nvPr/>
+      </p:nvGrpSpPr>
+      <p:grpSpPr>
+        <a:xfrm>
+          <a:off x="0" y="0"/>
+          <a:ext cx="0" cy="0"/>
+          <a:chOff x="0" y="0"/>
+          <a:chExt cx="0" cy="0"/>
+        </a:xfrm>
+      </p:grpSpPr>
+      <p:sp>
+        <p:nvSpPr>
+          <p:cNvPr id="2" name="Title 1"/>
+          <p:cNvSpPr>
+            <a:spLocks noGrp="1"/>
+          </p:cNvSpPr>
+          <p:nvPr>
+            <p:ph type="title"/>
+          </p:nvPr>
+        </p:nvSpPr>
+        <p:spPr/>
+        <p:txBody>
+          <a:bodyPr/>
+          <a:lstStyle/>
+          <a:p>
+            <a:r>
+              <a:rPr lang="en-US" dirty="0" smtClean="0"/>
               <a:t>Functions</a:t>
             </a:r>
             <a:endParaRPr lang="en-US" dirty="0"/>
@@ -3876,7 +3971,7 @@
 </p:sld>
 </file>
 
-<file path=ppt/slides/slide6.xml><?xml version="1.0" encoding="utf-8"?>
+<file path=ppt/slides/slide7.xml><?xml version="1.0" encoding="utf-8"?>
 <p:sld xmlns:a="http://schemas.openxmlformats.org/drawingml/2006/main" xmlns:r="http://schemas.openxmlformats.org/officeDocument/2006/relationships" xmlns:p="http://schemas.openxmlformats.org/presentationml/2006/main">
   <p:cSld>
     <p:spTree>

</xml_diff>